<commit_message>
Update MAMBA Study Application.pptx
</commit_message>
<xml_diff>
--- a/MAMBA Study Application.pptx
+++ b/MAMBA Study Application.pptx
@@ -6,9 +6,10 @@
   </p:sldMasterIdLst>
   <p:sldIdLst>
     <p:sldId id="256" r:id="rId2"/>
-    <p:sldId id="257" r:id="rId3"/>
-    <p:sldId id="259" r:id="rId4"/>
-    <p:sldId id="258" r:id="rId5"/>
+    <p:sldId id="260" r:id="rId3"/>
+    <p:sldId id="257" r:id="rId4"/>
+    <p:sldId id="259" r:id="rId5"/>
+    <p:sldId id="258" r:id="rId6"/>
   </p:sldIdLst>
   <p:sldSz cx="12192000" cy="6858000"/>
   <p:notesSz cx="6858000" cy="9144000"/>
@@ -581,7 +582,7 @@
           <a:p>
             <a:fld id="{8EB7F966-0333-4C63-9EA2-7A06EFA24E8D}" type="datetimeFigureOut">
               <a:rPr lang="en-US" smtClean="0"/>
-              <a:t>8/16/2021</a:t>
+              <a:t>8/24/2021</a:t>
             </a:fld>
             <a:endParaRPr lang="en-US"/>
           </a:p>
@@ -789,7 +790,7 @@
           <a:p>
             <a:fld id="{8EB7F966-0333-4C63-9EA2-7A06EFA24E8D}" type="datetimeFigureOut">
               <a:rPr lang="en-US" smtClean="0"/>
-              <a:t>8/16/2021</a:t>
+              <a:t>8/24/2021</a:t>
             </a:fld>
             <a:endParaRPr lang="en-US"/>
           </a:p>
@@ -1045,7 +1046,7 @@
           <a:p>
             <a:fld id="{8EB7F966-0333-4C63-9EA2-7A06EFA24E8D}" type="datetimeFigureOut">
               <a:rPr lang="en-US" smtClean="0"/>
-              <a:t>8/16/2021</a:t>
+              <a:t>8/24/2021</a:t>
             </a:fld>
             <a:endParaRPr lang="en-US"/>
           </a:p>
@@ -1219,7 +1220,7 @@
           <a:p>
             <a:fld id="{8EB7F966-0333-4C63-9EA2-7A06EFA24E8D}" type="datetimeFigureOut">
               <a:rPr lang="en-US" smtClean="0"/>
-              <a:t>8/16/2021</a:t>
+              <a:t>8/24/2021</a:t>
             </a:fld>
             <a:endParaRPr lang="en-US"/>
           </a:p>
@@ -1562,7 +1563,7 @@
           <a:p>
             <a:fld id="{8EB7F966-0333-4C63-9EA2-7A06EFA24E8D}" type="datetimeFigureOut">
               <a:rPr lang="en-US" smtClean="0"/>
-              <a:t>8/16/2021</a:t>
+              <a:t>8/24/2021</a:t>
             </a:fld>
             <a:endParaRPr lang="en-US"/>
           </a:p>
@@ -1837,7 +1838,7 @@
           <a:p>
             <a:fld id="{8EB7F966-0333-4C63-9EA2-7A06EFA24E8D}" type="datetimeFigureOut">
               <a:rPr lang="en-US" smtClean="0"/>
-              <a:t>8/16/2021</a:t>
+              <a:t>8/24/2021</a:t>
             </a:fld>
             <a:endParaRPr lang="en-US"/>
           </a:p>
@@ -2216,7 +2217,7 @@
           <a:p>
             <a:fld id="{8EB7F966-0333-4C63-9EA2-7A06EFA24E8D}" type="datetimeFigureOut">
               <a:rPr lang="en-US" smtClean="0"/>
-              <a:t>8/16/2021</a:t>
+              <a:t>8/24/2021</a:t>
             </a:fld>
             <a:endParaRPr lang="en-US"/>
           </a:p>
@@ -2334,7 +2335,7 @@
           <a:p>
             <a:fld id="{8EB7F966-0333-4C63-9EA2-7A06EFA24E8D}" type="datetimeFigureOut">
               <a:rPr lang="en-US" smtClean="0"/>
-              <a:t>8/16/2021</a:t>
+              <a:t>8/24/2021</a:t>
             </a:fld>
             <a:endParaRPr lang="en-US"/>
           </a:p>
@@ -2505,7 +2506,7 @@
           <a:p>
             <a:fld id="{8EB7F966-0333-4C63-9EA2-7A06EFA24E8D}" type="datetimeFigureOut">
               <a:rPr lang="en-US" smtClean="0"/>
-              <a:t>8/16/2021</a:t>
+              <a:t>8/24/2021</a:t>
             </a:fld>
             <a:endParaRPr lang="en-US"/>
           </a:p>
@@ -2859,7 +2860,7 @@
           <a:p>
             <a:fld id="{8EB7F966-0333-4C63-9EA2-7A06EFA24E8D}" type="datetimeFigureOut">
               <a:rPr lang="en-US" smtClean="0"/>
-              <a:t>8/16/2021</a:t>
+              <a:t>8/24/2021</a:t>
             </a:fld>
             <a:endParaRPr lang="en-US"/>
           </a:p>
@@ -3241,7 +3242,7 @@
           <a:p>
             <a:fld id="{8EB7F966-0333-4C63-9EA2-7A06EFA24E8D}" type="datetimeFigureOut">
               <a:rPr lang="en-US" smtClean="0"/>
-              <a:t>8/16/2021</a:t>
+              <a:t>8/24/2021</a:t>
             </a:fld>
             <a:endParaRPr lang="en-US"/>
           </a:p>
@@ -3528,7 +3529,7 @@
           <a:p>
             <a:fld id="{8EB7F966-0333-4C63-9EA2-7A06EFA24E8D}" type="datetimeFigureOut">
               <a:rPr lang="en-US" smtClean="0"/>
-              <a:t>8/16/2021</a:t>
+              <a:t>8/24/2021</a:t>
             </a:fld>
             <a:endParaRPr lang="en-US"/>
           </a:p>
@@ -4074,10 +4075,9 @@
           <a:lstStyle/>
           <a:p>
             <a:r>
-              <a:rPr lang="en-US"/>
-              <a:t>MAMBA</a:t>
-            </a:r>
-            <a:endParaRPr lang="en-US" dirty="0"/>
+              <a:rPr lang="en-US" dirty="0"/>
+              <a:t>MAMBA Application</a:t>
+            </a:r>
           </a:p>
         </p:txBody>
       </p:sp>
@@ -4141,7 +4141,7 @@
           <p:cNvPr id="2" name="Title 1">
             <a:extLst>
               <a:ext uri="{FF2B5EF4-FFF2-40B4-BE49-F238E27FC236}">
-                <a16:creationId xmlns:a16="http://schemas.microsoft.com/office/drawing/2014/main" id="{FB9B36EB-8075-4A07-AA4E-3D96097C9D7B}"/>
+                <a16:creationId xmlns:a16="http://schemas.microsoft.com/office/drawing/2014/main" id="{CEBE369D-B022-4045-9CFA-4C75323997F1}"/>
               </a:ext>
             </a:extLst>
           </p:cNvPr>
@@ -4159,7 +4159,7 @@
           <a:p>
             <a:r>
               <a:rPr lang="en-US" dirty="0"/>
-              <a:t>GSCAN</a:t>
+              <a:t>Background</a:t>
             </a:r>
           </a:p>
         </p:txBody>
@@ -4169,7 +4169,7 @@
           <p:cNvPr id="3" name="Content Placeholder 2">
             <a:extLst>
               <a:ext uri="{FF2B5EF4-FFF2-40B4-BE49-F238E27FC236}">
-                <a16:creationId xmlns:a16="http://schemas.microsoft.com/office/drawing/2014/main" id="{7F160D63-CB09-4389-825D-709BFE6A7B52}"/>
+                <a16:creationId xmlns:a16="http://schemas.microsoft.com/office/drawing/2014/main" id="{81D5D82F-DE85-4A4D-BF62-BB53FCC60C85}"/>
               </a:ext>
             </a:extLst>
           </p:cNvPr>
@@ -4182,9 +4182,7 @@
         </p:nvSpPr>
         <p:spPr/>
         <p:txBody>
-          <a:bodyPr>
-            <a:normAutofit lnSpcReduction="10000"/>
-          </a:bodyPr>
+          <a:bodyPr/>
           <a:lstStyle/>
           <a:p>
             <a:pPr>
@@ -4193,7 +4191,7 @@
             </a:pPr>
             <a:r>
               <a:rPr lang="en-US" dirty="0"/>
-              <a:t>Question: How did MAMBA perform in determining replicability of real data compared to other methods?</a:t>
+              <a:t>MAMBA - Meta-Analysis Model-based Assessment of Replicability</a:t>
             </a:r>
           </a:p>
           <a:p>
@@ -4203,7 +4201,27 @@
             </a:pPr>
             <a:r>
               <a:rPr lang="en-US" dirty="0"/>
-              <a:t>GWAS and Sequencing Consortium of Alcohol and Nicotine (GSCAN)</a:t>
+              <a:t>Takes in summary statistics and applies a two-level mixture model</a:t>
+            </a:r>
+          </a:p>
+          <a:p>
+            <a:pPr lvl="1">
+              <a:buFont typeface="Arial" panose="020B0604020202020204" pitchFamily="34" charset="0"/>
+              <a:buChar char="•"/>
+            </a:pPr>
+            <a:r>
+              <a:rPr lang="en-US" dirty="0"/>
+              <a:t>Provides a posterior probability of replicability (PPR) for SNP replicability</a:t>
+            </a:r>
+          </a:p>
+          <a:p>
+            <a:pPr lvl="1">
+              <a:buFont typeface="Arial" panose="020B0604020202020204" pitchFamily="34" charset="0"/>
+              <a:buChar char="•"/>
+            </a:pPr>
+            <a:r>
+              <a:rPr lang="en-US" dirty="0"/>
+              <a:t>Mixture model focused on real zero/non-zero effect and spurious/non-spurious association</a:t>
             </a:r>
           </a:p>
           <a:p>
@@ -4213,94 +4231,35 @@
             </a:pPr>
             <a:r>
               <a:rPr lang="en-US" dirty="0"/>
-              <a:t>Looked at Drinks per Week (</a:t>
-            </a:r>
-            <a:r>
-              <a:rPr lang="en-US" dirty="0" err="1"/>
-              <a:t>DrnkWk</a:t>
-            </a:r>
-            <a:r>
-              <a:rPr lang="en-US" dirty="0"/>
-              <a:t>), Smoking Initiation (</a:t>
-            </a:r>
-            <a:r>
-              <a:rPr lang="en-US" dirty="0" err="1"/>
-              <a:t>SmkInit</a:t>
-            </a:r>
-            <a:r>
-              <a:rPr lang="en-US" dirty="0"/>
-              <a:t>), Smoking Cessation (</a:t>
-            </a:r>
-            <a:r>
-              <a:rPr lang="en-US" dirty="0" err="1"/>
-              <a:t>SmkCes</a:t>
-            </a:r>
-            <a:r>
-              <a:rPr lang="en-US" dirty="0"/>
-              <a:t>), and Cigarettes Per Day (</a:t>
-            </a:r>
-            <a:r>
-              <a:rPr lang="en-US" dirty="0" err="1"/>
-              <a:t>CigDay</a:t>
-            </a:r>
-            <a:r>
-              <a:rPr lang="en-US" dirty="0"/>
-              <a:t>) phenotypes</a:t>
-            </a:r>
-          </a:p>
-          <a:p>
-            <a:pPr>
+              <a:t>Purported benefits:</a:t>
+            </a:r>
+          </a:p>
+          <a:p>
+            <a:pPr lvl="1">
               <a:buFont typeface="Arial" panose="020B0604020202020204" pitchFamily="34" charset="0"/>
               <a:buChar char="•"/>
             </a:pPr>
             <a:r>
               <a:rPr lang="en-US" dirty="0"/>
-              <a:t>Treated 23andMe dataset as replication dataset, and other GSCAN datasets as discovery datasets</a:t>
-            </a:r>
-          </a:p>
-          <a:p>
-            <a:pPr>
+              <a:t>If fixed-effect assumptions hold, MAMBA becomes similar to inverse variance weighted meta-analysis</a:t>
+            </a:r>
+          </a:p>
+          <a:p>
+            <a:pPr lvl="1">
               <a:buFont typeface="Arial" panose="020B0604020202020204" pitchFamily="34" charset="0"/>
               <a:buChar char="•"/>
             </a:pPr>
             <a:r>
               <a:rPr lang="en-US" dirty="0"/>
-              <a:t>“To compare different methods we used Kendall’s-tau27 to assess the concordance between p-values in discovery and replication phase.”</a:t>
-            </a:r>
-          </a:p>
-          <a:p>
-            <a:pPr>
-              <a:buFont typeface="Arial" panose="020B0604020202020204" pitchFamily="34" charset="0"/>
-              <a:buChar char="•"/>
-            </a:pPr>
-            <a:r>
-              <a:rPr lang="en-US" dirty="0"/>
-              <a:t>Replicable studies should have high p-values in replication and discovery cohorts</a:t>
-            </a:r>
-          </a:p>
-          <a:p>
-            <a:pPr>
-              <a:buFont typeface="Arial" panose="020B0604020202020204" pitchFamily="34" charset="0"/>
-              <a:buChar char="•"/>
-            </a:pPr>
-            <a:r>
-              <a:rPr lang="en-US" dirty="0"/>
-              <a:t>Nonreplicable studies with spurious signals would have lower p-values in replication cohort</a:t>
-            </a:r>
-          </a:p>
-          <a:p>
-            <a:pPr>
-              <a:buFont typeface="Arial" panose="020B0604020202020204" pitchFamily="34" charset="0"/>
-              <a:buChar char="•"/>
-            </a:pPr>
-            <a:endParaRPr lang="en-US" dirty="0"/>
+              <a:t>Uses information from other SNPs, genome-wide pooling</a:t>
+            </a:r>
           </a:p>
         </p:txBody>
       </p:sp>
     </p:spTree>
     <p:extLst>
       <p:ext uri="{BB962C8B-B14F-4D97-AF65-F5344CB8AC3E}">
-        <p14:creationId xmlns:p14="http://schemas.microsoft.com/office/powerpoint/2010/main" val="3013163275"/>
+        <p14:creationId xmlns:p14="http://schemas.microsoft.com/office/powerpoint/2010/main" val="3435031994"/>
       </p:ext>
     </p:extLst>
   </p:cSld>
@@ -4332,6 +4291,197 @@
           <p:cNvPr id="2" name="Title 1">
             <a:extLst>
               <a:ext uri="{FF2B5EF4-FFF2-40B4-BE49-F238E27FC236}">
+                <a16:creationId xmlns:a16="http://schemas.microsoft.com/office/drawing/2014/main" id="{FB9B36EB-8075-4A07-AA4E-3D96097C9D7B}"/>
+              </a:ext>
+            </a:extLst>
+          </p:cNvPr>
+          <p:cNvSpPr>
+            <a:spLocks noGrp="1"/>
+          </p:cNvSpPr>
+          <p:nvPr>
+            <p:ph type="title"/>
+          </p:nvPr>
+        </p:nvSpPr>
+        <p:spPr/>
+        <p:txBody>
+          <a:bodyPr/>
+          <a:lstStyle/>
+          <a:p>
+            <a:r>
+              <a:rPr lang="en-US" dirty="0"/>
+              <a:t>GSCAN</a:t>
+            </a:r>
+          </a:p>
+        </p:txBody>
+      </p:sp>
+      <p:sp>
+        <p:nvSpPr>
+          <p:cNvPr id="3" name="Content Placeholder 2">
+            <a:extLst>
+              <a:ext uri="{FF2B5EF4-FFF2-40B4-BE49-F238E27FC236}">
+                <a16:creationId xmlns:a16="http://schemas.microsoft.com/office/drawing/2014/main" id="{7F160D63-CB09-4389-825D-709BFE6A7B52}"/>
+              </a:ext>
+            </a:extLst>
+          </p:cNvPr>
+          <p:cNvSpPr>
+            <a:spLocks noGrp="1"/>
+          </p:cNvSpPr>
+          <p:nvPr>
+            <p:ph idx="1"/>
+          </p:nvPr>
+        </p:nvSpPr>
+        <p:spPr/>
+        <p:txBody>
+          <a:bodyPr>
+            <a:normAutofit lnSpcReduction="10000"/>
+          </a:bodyPr>
+          <a:lstStyle/>
+          <a:p>
+            <a:pPr>
+              <a:buFont typeface="Arial" panose="020B0604020202020204" pitchFamily="34" charset="0"/>
+              <a:buChar char="•"/>
+            </a:pPr>
+            <a:r>
+              <a:rPr lang="en-US" dirty="0"/>
+              <a:t>Question: How did MAMBA perform in determining replicability of real data compared to other methods?</a:t>
+            </a:r>
+          </a:p>
+          <a:p>
+            <a:pPr>
+              <a:buFont typeface="Arial" panose="020B0604020202020204" pitchFamily="34" charset="0"/>
+              <a:buChar char="•"/>
+            </a:pPr>
+            <a:r>
+              <a:rPr lang="en-US" dirty="0"/>
+              <a:t>GWAS and Sequencing Consortium of Alcohol and Nicotine (GSCAN)</a:t>
+            </a:r>
+          </a:p>
+          <a:p>
+            <a:pPr>
+              <a:buFont typeface="Arial" panose="020B0604020202020204" pitchFamily="34" charset="0"/>
+              <a:buChar char="•"/>
+            </a:pPr>
+            <a:r>
+              <a:rPr lang="en-US" dirty="0"/>
+              <a:t>Looked at Drinks per Week (</a:t>
+            </a:r>
+            <a:r>
+              <a:rPr lang="en-US" dirty="0" err="1"/>
+              <a:t>DrnkWk</a:t>
+            </a:r>
+            <a:r>
+              <a:rPr lang="en-US" dirty="0"/>
+              <a:t>), Smoking Initiation (</a:t>
+            </a:r>
+            <a:r>
+              <a:rPr lang="en-US" dirty="0" err="1"/>
+              <a:t>SmkInit</a:t>
+            </a:r>
+            <a:r>
+              <a:rPr lang="en-US" dirty="0"/>
+              <a:t>), Smoking Cessation (</a:t>
+            </a:r>
+            <a:r>
+              <a:rPr lang="en-US" dirty="0" err="1"/>
+              <a:t>SmkCes</a:t>
+            </a:r>
+            <a:r>
+              <a:rPr lang="en-US" dirty="0"/>
+              <a:t>), and Cigarettes Per Day (</a:t>
+            </a:r>
+            <a:r>
+              <a:rPr lang="en-US" dirty="0" err="1"/>
+              <a:t>CigDay</a:t>
+            </a:r>
+            <a:r>
+              <a:rPr lang="en-US" dirty="0"/>
+              <a:t>) phenotypes</a:t>
+            </a:r>
+          </a:p>
+          <a:p>
+            <a:pPr>
+              <a:buFont typeface="Arial" panose="020B0604020202020204" pitchFamily="34" charset="0"/>
+              <a:buChar char="•"/>
+            </a:pPr>
+            <a:r>
+              <a:rPr lang="en-US" dirty="0"/>
+              <a:t>Treated 23andMe dataset as replication dataset, and other GSCAN datasets as discovery datasets</a:t>
+            </a:r>
+          </a:p>
+          <a:p>
+            <a:pPr>
+              <a:buFont typeface="Arial" panose="020B0604020202020204" pitchFamily="34" charset="0"/>
+              <a:buChar char="•"/>
+            </a:pPr>
+            <a:r>
+              <a:rPr lang="en-US" dirty="0"/>
+              <a:t>“To compare different methods we used Kendall’s-tau27 to assess the concordance between p-values in discovery and replication phase.”</a:t>
+            </a:r>
+          </a:p>
+          <a:p>
+            <a:pPr>
+              <a:buFont typeface="Arial" panose="020B0604020202020204" pitchFamily="34" charset="0"/>
+              <a:buChar char="•"/>
+            </a:pPr>
+            <a:r>
+              <a:rPr lang="en-US" dirty="0"/>
+              <a:t>Replicable studies should have high p-values in replication and discovery cohorts</a:t>
+            </a:r>
+          </a:p>
+          <a:p>
+            <a:pPr>
+              <a:buFont typeface="Arial" panose="020B0604020202020204" pitchFamily="34" charset="0"/>
+              <a:buChar char="•"/>
+            </a:pPr>
+            <a:r>
+              <a:rPr lang="en-US" dirty="0"/>
+              <a:t>Nonreplicable studies with spurious signals would have lower p-values in replication cohort</a:t>
+            </a:r>
+          </a:p>
+          <a:p>
+            <a:pPr>
+              <a:buFont typeface="Arial" panose="020B0604020202020204" pitchFamily="34" charset="0"/>
+              <a:buChar char="•"/>
+            </a:pPr>
+            <a:endParaRPr lang="en-US" dirty="0"/>
+          </a:p>
+        </p:txBody>
+      </p:sp>
+    </p:spTree>
+    <p:extLst>
+      <p:ext uri="{BB962C8B-B14F-4D97-AF65-F5344CB8AC3E}">
+        <p14:creationId xmlns:p14="http://schemas.microsoft.com/office/powerpoint/2010/main" val="3013163275"/>
+      </p:ext>
+    </p:extLst>
+  </p:cSld>
+  <p:clrMapOvr>
+    <a:masterClrMapping/>
+  </p:clrMapOvr>
+</p:sld>
+</file>
+
+<file path=ppt/slides/slide4.xml><?xml version="1.0" encoding="utf-8"?>
+<p:sld xmlns:a="http://schemas.openxmlformats.org/drawingml/2006/main" xmlns:r="http://schemas.openxmlformats.org/officeDocument/2006/relationships" xmlns:p="http://schemas.openxmlformats.org/presentationml/2006/main">
+  <p:cSld>
+    <p:spTree>
+      <p:nvGrpSpPr>
+        <p:cNvPr id="1" name=""/>
+        <p:cNvGrpSpPr/>
+        <p:nvPr/>
+      </p:nvGrpSpPr>
+      <p:grpSpPr>
+        <a:xfrm>
+          <a:off x="0" y="0"/>
+          <a:ext cx="0" cy="0"/>
+          <a:chOff x="0" y="0"/>
+          <a:chExt cx="0" cy="0"/>
+        </a:xfrm>
+      </p:grpSpPr>
+      <p:sp>
+        <p:nvSpPr>
+          <p:cNvPr id="2" name="Title 1">
+            <a:extLst>
+              <a:ext uri="{FF2B5EF4-FFF2-40B4-BE49-F238E27FC236}">
                 <a16:creationId xmlns:a16="http://schemas.microsoft.com/office/drawing/2014/main" id="{F534D7E5-A8B7-4D5F-B970-29881180D972}"/>
               </a:ext>
             </a:extLst>
@@ -4532,7 +4682,7 @@
 </p:sld>
 </file>
 
-<file path=ppt/slides/slide4.xml><?xml version="1.0" encoding="utf-8"?>
+<file path=ppt/slides/slide5.xml><?xml version="1.0" encoding="utf-8"?>
 <p:sld xmlns:a="http://schemas.openxmlformats.org/drawingml/2006/main" xmlns:r="http://schemas.openxmlformats.org/officeDocument/2006/relationships" xmlns:p="http://schemas.openxmlformats.org/presentationml/2006/main">
   <p:cSld>
     <p:bg>

</xml_diff>